<commit_message>
Many SNR and phantom centering changes
</commit_message>
<xml_diff>
--- a/source/images/icons.pptx
+++ b/source/images/icons.pptx
@@ -4,6 +4,9 @@
   <p:sldMasterIdLst>
     <p:sldMasterId id="2147483648" r:id="rId1"/>
   </p:sldMasterIdLst>
+  <p:sldIdLst>
+    <p:sldId id="256" r:id="rId2"/>
+  </p:sldIdLst>
   <p:sldSz cx="9144000" cy="6858000" type="screen4x3"/>
   <p:notesSz cx="6858000" cy="9144000"/>
   <p:defaultTextStyle>
@@ -286,7 +289,7 @@
             <a:fld id="{1D8BD707-D9CF-40AE-B4C6-C98DA3205C09}" type="datetimeFigureOut">
               <a:rPr lang="en-US" smtClean="0"/>
               <a:pPr/>
-              <a:t>9/18/2006</a:t>
+              <a:t>1/19/2016</a:t>
             </a:fld>
             <a:endParaRPr lang="en-US"/>
           </a:p>
@@ -453,7 +456,7 @@
             <a:fld id="{1D8BD707-D9CF-40AE-B4C6-C98DA3205C09}" type="datetimeFigureOut">
               <a:rPr lang="en-US" smtClean="0"/>
               <a:pPr/>
-              <a:t>9/18/2006</a:t>
+              <a:t>1/19/2016</a:t>
             </a:fld>
             <a:endParaRPr lang="en-US"/>
           </a:p>
@@ -630,7 +633,7 @@
             <a:fld id="{1D8BD707-D9CF-40AE-B4C6-C98DA3205C09}" type="datetimeFigureOut">
               <a:rPr lang="en-US" smtClean="0"/>
               <a:pPr/>
-              <a:t>9/18/2006</a:t>
+              <a:t>1/19/2016</a:t>
             </a:fld>
             <a:endParaRPr lang="en-US"/>
           </a:p>
@@ -797,7 +800,7 @@
             <a:fld id="{1D8BD707-D9CF-40AE-B4C6-C98DA3205C09}" type="datetimeFigureOut">
               <a:rPr lang="en-US" smtClean="0"/>
               <a:pPr/>
-              <a:t>9/18/2006</a:t>
+              <a:t>1/19/2016</a:t>
             </a:fld>
             <a:endParaRPr lang="en-US"/>
           </a:p>
@@ -1040,7 +1043,7 @@
             <a:fld id="{1D8BD707-D9CF-40AE-B4C6-C98DA3205C09}" type="datetimeFigureOut">
               <a:rPr lang="en-US" smtClean="0"/>
               <a:pPr/>
-              <a:t>9/18/2006</a:t>
+              <a:t>1/19/2016</a:t>
             </a:fld>
             <a:endParaRPr lang="en-US"/>
           </a:p>
@@ -1325,7 +1328,7 @@
             <a:fld id="{1D8BD707-D9CF-40AE-B4C6-C98DA3205C09}" type="datetimeFigureOut">
               <a:rPr lang="en-US" smtClean="0"/>
               <a:pPr/>
-              <a:t>9/18/2006</a:t>
+              <a:t>1/19/2016</a:t>
             </a:fld>
             <a:endParaRPr lang="en-US"/>
           </a:p>
@@ -1744,7 +1747,7 @@
             <a:fld id="{1D8BD707-D9CF-40AE-B4C6-C98DA3205C09}" type="datetimeFigureOut">
               <a:rPr lang="en-US" smtClean="0"/>
               <a:pPr/>
-              <a:t>9/18/2006</a:t>
+              <a:t>1/19/2016</a:t>
             </a:fld>
             <a:endParaRPr lang="en-US"/>
           </a:p>
@@ -1859,7 +1862,7 @@
             <a:fld id="{1D8BD707-D9CF-40AE-B4C6-C98DA3205C09}" type="datetimeFigureOut">
               <a:rPr lang="en-US" smtClean="0"/>
               <a:pPr/>
-              <a:t>9/18/2006</a:t>
+              <a:t>1/19/2016</a:t>
             </a:fld>
             <a:endParaRPr lang="en-US"/>
           </a:p>
@@ -1951,7 +1954,7 @@
             <a:fld id="{1D8BD707-D9CF-40AE-B4C6-C98DA3205C09}" type="datetimeFigureOut">
               <a:rPr lang="en-US" smtClean="0"/>
               <a:pPr/>
-              <a:t>9/18/2006</a:t>
+              <a:t>1/19/2016</a:t>
             </a:fld>
             <a:endParaRPr lang="en-US"/>
           </a:p>
@@ -2225,7 +2228,7 @@
             <a:fld id="{1D8BD707-D9CF-40AE-B4C6-C98DA3205C09}" type="datetimeFigureOut">
               <a:rPr lang="en-US" smtClean="0"/>
               <a:pPr/>
-              <a:t>9/18/2006</a:t>
+              <a:t>1/19/2016</a:t>
             </a:fld>
             <a:endParaRPr lang="en-US"/>
           </a:p>
@@ -2475,7 +2478,7 @@
             <a:fld id="{1D8BD707-D9CF-40AE-B4C6-C98DA3205C09}" type="datetimeFigureOut">
               <a:rPr lang="en-US" smtClean="0"/>
               <a:pPr/>
-              <a:t>9/18/2006</a:t>
+              <a:t>1/19/2016</a:t>
             </a:fld>
             <a:endParaRPr lang="en-US"/>
           </a:p>
@@ -2685,7 +2688,7 @@
             <a:fld id="{1D8BD707-D9CF-40AE-B4C6-C98DA3205C09}" type="datetimeFigureOut">
               <a:rPr lang="en-US" smtClean="0"/>
               <a:pPr/>
-              <a:t>9/18/2006</a:t>
+              <a:t>1/19/2016</a:t>
             </a:fld>
             <a:endParaRPr lang="en-US"/>
           </a:p>
@@ -3037,6 +3040,1051 @@
     </p:otherStyle>
   </p:txStyles>
 </p:sldMaster>
+</file>
+
+<file path=ppt/slides/slide1.xml><?xml version="1.0" encoding="utf-8"?>
+<p:sld xmlns:a="http://schemas.openxmlformats.org/drawingml/2006/main" xmlns:r="http://schemas.openxmlformats.org/officeDocument/2006/relationships" xmlns:p="http://schemas.openxmlformats.org/presentationml/2006/main">
+  <p:cSld>
+    <p:spTree>
+      <p:nvGrpSpPr>
+        <p:cNvPr id="1" name=""/>
+        <p:cNvGrpSpPr/>
+        <p:nvPr/>
+      </p:nvGrpSpPr>
+      <p:grpSpPr>
+        <a:xfrm>
+          <a:off x="0" y="0"/>
+          <a:ext cx="0" cy="0"/>
+          <a:chOff x="0" y="0"/>
+          <a:chExt cx="0" cy="0"/>
+        </a:xfrm>
+      </p:grpSpPr>
+      <p:sp>
+        <p:nvSpPr>
+          <p:cNvPr id="4" name="Rectangle 3"/>
+          <p:cNvSpPr/>
+          <p:nvPr/>
+        </p:nvSpPr>
+        <p:spPr>
+          <a:xfrm>
+            <a:off x="762000" y="685800"/>
+            <a:ext cx="2286000" cy="1676400"/>
+          </a:xfrm>
+          <a:prstGeom prst="rect">
+            <a:avLst/>
+          </a:prstGeom>
+          <a:noFill/>
+          <a:ln w="76200">
+            <a:solidFill>
+              <a:schemeClr val="tx1"/>
+            </a:solidFill>
+            <a:prstDash val="dash"/>
+          </a:ln>
+        </p:spPr>
+        <p:style>
+          <a:lnRef idx="2">
+            <a:schemeClr val="accent1">
+              <a:shade val="50000"/>
+            </a:schemeClr>
+          </a:lnRef>
+          <a:fillRef idx="1">
+            <a:schemeClr val="accent1"/>
+          </a:fillRef>
+          <a:effectRef idx="0">
+            <a:schemeClr val="accent1"/>
+          </a:effectRef>
+          <a:fontRef idx="minor">
+            <a:schemeClr val="lt1"/>
+          </a:fontRef>
+        </p:style>
+        <p:txBody>
+          <a:bodyPr rtlCol="0" anchor="ctr"/>
+          <a:lstStyle/>
+          <a:p>
+            <a:pPr algn="ctr"/>
+            <a:endParaRPr lang="en-GB"/>
+          </a:p>
+        </p:txBody>
+      </p:sp>
+      <p:sp>
+        <p:nvSpPr>
+          <p:cNvPr id="6" name="Oval 5"/>
+          <p:cNvSpPr/>
+          <p:nvPr/>
+        </p:nvSpPr>
+        <p:spPr>
+          <a:xfrm>
+            <a:off x="4572000" y="685800"/>
+            <a:ext cx="2819400" cy="1905000"/>
+          </a:xfrm>
+          <a:prstGeom prst="ellipse">
+            <a:avLst/>
+          </a:prstGeom>
+          <a:noFill/>
+          <a:ln w="76200">
+            <a:solidFill>
+              <a:schemeClr val="tx1"/>
+            </a:solidFill>
+            <a:prstDash val="dash"/>
+          </a:ln>
+        </p:spPr>
+        <p:style>
+          <a:lnRef idx="2">
+            <a:schemeClr val="accent1">
+              <a:shade val="50000"/>
+            </a:schemeClr>
+          </a:lnRef>
+          <a:fillRef idx="1">
+            <a:schemeClr val="accent1"/>
+          </a:fillRef>
+          <a:effectRef idx="0">
+            <a:schemeClr val="accent1"/>
+          </a:effectRef>
+          <a:fontRef idx="minor">
+            <a:schemeClr val="lt1"/>
+          </a:fontRef>
+        </p:style>
+        <p:txBody>
+          <a:bodyPr rot="0" spcFirstLastPara="0" vertOverflow="overflow" horzOverflow="overflow" vert="horz" wrap="square" lIns="91440" tIns="45720" rIns="91440" bIns="45720" numCol="1" spcCol="0" rtlCol="0" fromWordArt="0" anchor="ctr" anchorCtr="0" forceAA="0" compatLnSpc="1">
+            <a:prstTxWarp prst="textNoShape">
+              <a:avLst/>
+            </a:prstTxWarp>
+            <a:noAutofit/>
+          </a:bodyPr>
+          <a:lstStyle/>
+          <a:p>
+            <a:pPr algn="ctr"/>
+            <a:endParaRPr lang="en-GB"/>
+          </a:p>
+        </p:txBody>
+      </p:sp>
+      <p:sp>
+        <p:nvSpPr>
+          <p:cNvPr id="8" name="Freeform 7"/>
+          <p:cNvSpPr/>
+          <p:nvPr/>
+        </p:nvSpPr>
+        <p:spPr>
+          <a:xfrm>
+            <a:off x="495538" y="3124200"/>
+            <a:ext cx="4076462" cy="2262753"/>
+          </a:xfrm>
+          <a:custGeom>
+            <a:avLst/>
+            <a:gdLst>
+              <a:gd name="connsiteX0" fmla="*/ 1394847 w 4076462"/>
+              <a:gd name="connsiteY0" fmla="*/ 1844299 h 2262753"/>
+              <a:gd name="connsiteX1" fmla="*/ 1317356 w 4076462"/>
+              <a:gd name="connsiteY1" fmla="*/ 1875295 h 2262753"/>
+              <a:gd name="connsiteX2" fmla="*/ 1193369 w 4076462"/>
+              <a:gd name="connsiteY2" fmla="*/ 1937288 h 2262753"/>
+              <a:gd name="connsiteX3" fmla="*/ 681925 w 4076462"/>
+              <a:gd name="connsiteY3" fmla="*/ 1921790 h 2262753"/>
+              <a:gd name="connsiteX4" fmla="*/ 635430 w 4076462"/>
+              <a:gd name="connsiteY4" fmla="*/ 1906292 h 2262753"/>
+              <a:gd name="connsiteX5" fmla="*/ 480447 w 4076462"/>
+              <a:gd name="connsiteY5" fmla="*/ 1875295 h 2262753"/>
+              <a:gd name="connsiteX6" fmla="*/ 433952 w 4076462"/>
+              <a:gd name="connsiteY6" fmla="*/ 1828800 h 2262753"/>
+              <a:gd name="connsiteX7" fmla="*/ 356461 w 4076462"/>
+              <a:gd name="connsiteY7" fmla="*/ 1797804 h 2262753"/>
+              <a:gd name="connsiteX8" fmla="*/ 325464 w 4076462"/>
+              <a:gd name="connsiteY8" fmla="*/ 1735810 h 2262753"/>
+              <a:gd name="connsiteX9" fmla="*/ 278969 w 4076462"/>
+              <a:gd name="connsiteY9" fmla="*/ 1704814 h 2262753"/>
+              <a:gd name="connsiteX10" fmla="*/ 232474 w 4076462"/>
+              <a:gd name="connsiteY10" fmla="*/ 1642821 h 2262753"/>
+              <a:gd name="connsiteX11" fmla="*/ 185980 w 4076462"/>
+              <a:gd name="connsiteY11" fmla="*/ 1596326 h 2262753"/>
+              <a:gd name="connsiteX12" fmla="*/ 170481 w 4076462"/>
+              <a:gd name="connsiteY12" fmla="*/ 1549831 h 2262753"/>
+              <a:gd name="connsiteX13" fmla="*/ 46495 w 4076462"/>
+              <a:gd name="connsiteY13" fmla="*/ 1379349 h 2262753"/>
+              <a:gd name="connsiteX14" fmla="*/ 0 w 4076462"/>
+              <a:gd name="connsiteY14" fmla="*/ 1239865 h 2262753"/>
+              <a:gd name="connsiteX15" fmla="*/ 15498 w 4076462"/>
+              <a:gd name="connsiteY15" fmla="*/ 790414 h 2262753"/>
+              <a:gd name="connsiteX16" fmla="*/ 46495 w 4076462"/>
+              <a:gd name="connsiteY16" fmla="*/ 697424 h 2262753"/>
+              <a:gd name="connsiteX17" fmla="*/ 139485 w 4076462"/>
+              <a:gd name="connsiteY17" fmla="*/ 480448 h 2262753"/>
+              <a:gd name="connsiteX18" fmla="*/ 170481 w 4076462"/>
+              <a:gd name="connsiteY18" fmla="*/ 433953 h 2262753"/>
+              <a:gd name="connsiteX19" fmla="*/ 216976 w 4076462"/>
+              <a:gd name="connsiteY19" fmla="*/ 387458 h 2262753"/>
+              <a:gd name="connsiteX20" fmla="*/ 247973 w 4076462"/>
+              <a:gd name="connsiteY20" fmla="*/ 325465 h 2262753"/>
+              <a:gd name="connsiteX21" fmla="*/ 340963 w 4076462"/>
+              <a:gd name="connsiteY21" fmla="*/ 232475 h 2262753"/>
+              <a:gd name="connsiteX22" fmla="*/ 402956 w 4076462"/>
+              <a:gd name="connsiteY22" fmla="*/ 170482 h 2262753"/>
+              <a:gd name="connsiteX23" fmla="*/ 495946 w 4076462"/>
+              <a:gd name="connsiteY23" fmla="*/ 77492 h 2262753"/>
+              <a:gd name="connsiteX24" fmla="*/ 542441 w 4076462"/>
+              <a:gd name="connsiteY24" fmla="*/ 30997 h 2262753"/>
+              <a:gd name="connsiteX25" fmla="*/ 604434 w 4076462"/>
+              <a:gd name="connsiteY25" fmla="*/ 15499 h 2262753"/>
+              <a:gd name="connsiteX26" fmla="*/ 650929 w 4076462"/>
+              <a:gd name="connsiteY26" fmla="*/ 0 h 2262753"/>
+              <a:gd name="connsiteX27" fmla="*/ 1456841 w 4076462"/>
+              <a:gd name="connsiteY27" fmla="*/ 15499 h 2262753"/>
+              <a:gd name="connsiteX28" fmla="*/ 1503336 w 4076462"/>
+              <a:gd name="connsiteY28" fmla="*/ 30997 h 2262753"/>
+              <a:gd name="connsiteX29" fmla="*/ 1627322 w 4076462"/>
+              <a:gd name="connsiteY29" fmla="*/ 123987 h 2262753"/>
+              <a:gd name="connsiteX30" fmla="*/ 1673817 w 4076462"/>
+              <a:gd name="connsiteY30" fmla="*/ 170482 h 2262753"/>
+              <a:gd name="connsiteX31" fmla="*/ 1766807 w 4076462"/>
+              <a:gd name="connsiteY31" fmla="*/ 325465 h 2262753"/>
+              <a:gd name="connsiteX32" fmla="*/ 1859797 w 4076462"/>
+              <a:gd name="connsiteY32" fmla="*/ 418454 h 2262753"/>
+              <a:gd name="connsiteX33" fmla="*/ 1890793 w 4076462"/>
+              <a:gd name="connsiteY33" fmla="*/ 464949 h 2262753"/>
+              <a:gd name="connsiteX34" fmla="*/ 1968285 w 4076462"/>
+              <a:gd name="connsiteY34" fmla="*/ 542441 h 2262753"/>
+              <a:gd name="connsiteX35" fmla="*/ 2030278 w 4076462"/>
+              <a:gd name="connsiteY35" fmla="*/ 635431 h 2262753"/>
+              <a:gd name="connsiteX36" fmla="*/ 2107769 w 4076462"/>
+              <a:gd name="connsiteY36" fmla="*/ 712922 h 2262753"/>
+              <a:gd name="connsiteX37" fmla="*/ 2247254 w 4076462"/>
+              <a:gd name="connsiteY37" fmla="*/ 805912 h 2262753"/>
+              <a:gd name="connsiteX38" fmla="*/ 2309247 w 4076462"/>
+              <a:gd name="connsiteY38" fmla="*/ 867905 h 2262753"/>
+              <a:gd name="connsiteX39" fmla="*/ 2386739 w 4076462"/>
+              <a:gd name="connsiteY39" fmla="*/ 898902 h 2262753"/>
+              <a:gd name="connsiteX40" fmla="*/ 2479729 w 4076462"/>
+              <a:gd name="connsiteY40" fmla="*/ 929899 h 2262753"/>
+              <a:gd name="connsiteX41" fmla="*/ 2526224 w 4076462"/>
+              <a:gd name="connsiteY41" fmla="*/ 960895 h 2262753"/>
+              <a:gd name="connsiteX42" fmla="*/ 2650210 w 4076462"/>
+              <a:gd name="connsiteY42" fmla="*/ 976393 h 2262753"/>
+              <a:gd name="connsiteX43" fmla="*/ 2712203 w 4076462"/>
+              <a:gd name="connsiteY43" fmla="*/ 991892 h 2262753"/>
+              <a:gd name="connsiteX44" fmla="*/ 2975674 w 4076462"/>
+              <a:gd name="connsiteY44" fmla="*/ 960895 h 2262753"/>
+              <a:gd name="connsiteX45" fmla="*/ 3037668 w 4076462"/>
+              <a:gd name="connsiteY45" fmla="*/ 929899 h 2262753"/>
+              <a:gd name="connsiteX46" fmla="*/ 3425125 w 4076462"/>
+              <a:gd name="connsiteY46" fmla="*/ 945397 h 2262753"/>
+              <a:gd name="connsiteX47" fmla="*/ 3642102 w 4076462"/>
+              <a:gd name="connsiteY47" fmla="*/ 976393 h 2262753"/>
+              <a:gd name="connsiteX48" fmla="*/ 3735091 w 4076462"/>
+              <a:gd name="connsiteY48" fmla="*/ 1038387 h 2262753"/>
+              <a:gd name="connsiteX49" fmla="*/ 3781586 w 4076462"/>
+              <a:gd name="connsiteY49" fmla="*/ 1069383 h 2262753"/>
+              <a:gd name="connsiteX50" fmla="*/ 3828081 w 4076462"/>
+              <a:gd name="connsiteY50" fmla="*/ 1115878 h 2262753"/>
+              <a:gd name="connsiteX51" fmla="*/ 3843580 w 4076462"/>
+              <a:gd name="connsiteY51" fmla="*/ 1162373 h 2262753"/>
+              <a:gd name="connsiteX52" fmla="*/ 3936569 w 4076462"/>
+              <a:gd name="connsiteY52" fmla="*/ 1255363 h 2262753"/>
+              <a:gd name="connsiteX53" fmla="*/ 3983064 w 4076462"/>
+              <a:gd name="connsiteY53" fmla="*/ 1301858 h 2262753"/>
+              <a:gd name="connsiteX54" fmla="*/ 4014061 w 4076462"/>
+              <a:gd name="connsiteY54" fmla="*/ 1348353 h 2262753"/>
+              <a:gd name="connsiteX55" fmla="*/ 4060556 w 4076462"/>
+              <a:gd name="connsiteY55" fmla="*/ 1518834 h 2262753"/>
+              <a:gd name="connsiteX56" fmla="*/ 4060556 w 4076462"/>
+              <a:gd name="connsiteY56" fmla="*/ 1983783 h 2262753"/>
+              <a:gd name="connsiteX57" fmla="*/ 4045058 w 4076462"/>
+              <a:gd name="connsiteY57" fmla="*/ 2045777 h 2262753"/>
+              <a:gd name="connsiteX58" fmla="*/ 3998563 w 4076462"/>
+              <a:gd name="connsiteY58" fmla="*/ 2107770 h 2262753"/>
+              <a:gd name="connsiteX59" fmla="*/ 3967566 w 4076462"/>
+              <a:gd name="connsiteY59" fmla="*/ 2154265 h 2262753"/>
+              <a:gd name="connsiteX60" fmla="*/ 3921071 w 4076462"/>
+              <a:gd name="connsiteY60" fmla="*/ 2185261 h 2262753"/>
+              <a:gd name="connsiteX61" fmla="*/ 3766088 w 4076462"/>
+              <a:gd name="connsiteY61" fmla="*/ 2216258 h 2262753"/>
+              <a:gd name="connsiteX62" fmla="*/ 3580108 w 4076462"/>
+              <a:gd name="connsiteY62" fmla="*/ 2247254 h 2262753"/>
+              <a:gd name="connsiteX63" fmla="*/ 3487119 w 4076462"/>
+              <a:gd name="connsiteY63" fmla="*/ 2262753 h 2262753"/>
+              <a:gd name="connsiteX64" fmla="*/ 3084163 w 4076462"/>
+              <a:gd name="connsiteY64" fmla="*/ 2247254 h 2262753"/>
+              <a:gd name="connsiteX65" fmla="*/ 2913681 w 4076462"/>
+              <a:gd name="connsiteY65" fmla="*/ 2200760 h 2262753"/>
+              <a:gd name="connsiteX66" fmla="*/ 2851688 w 4076462"/>
+              <a:gd name="connsiteY66" fmla="*/ 2185261 h 2262753"/>
+              <a:gd name="connsiteX67" fmla="*/ 2758698 w 4076462"/>
+              <a:gd name="connsiteY67" fmla="*/ 2107770 h 2262753"/>
+              <a:gd name="connsiteX68" fmla="*/ 2712203 w 4076462"/>
+              <a:gd name="connsiteY68" fmla="*/ 2045777 h 2262753"/>
+              <a:gd name="connsiteX69" fmla="*/ 2665708 w 4076462"/>
+              <a:gd name="connsiteY69" fmla="*/ 1999282 h 2262753"/>
+              <a:gd name="connsiteX70" fmla="*/ 2572719 w 4076462"/>
+              <a:gd name="connsiteY70" fmla="*/ 1875295 h 2262753"/>
+              <a:gd name="connsiteX71" fmla="*/ 2510725 w 4076462"/>
+              <a:gd name="connsiteY71" fmla="*/ 1782305 h 2262753"/>
+              <a:gd name="connsiteX72" fmla="*/ 2448732 w 4076462"/>
+              <a:gd name="connsiteY72" fmla="*/ 1704814 h 2262753"/>
+              <a:gd name="connsiteX73" fmla="*/ 2386739 w 4076462"/>
+              <a:gd name="connsiteY73" fmla="*/ 1627322 h 2262753"/>
+              <a:gd name="connsiteX74" fmla="*/ 2355742 w 4076462"/>
+              <a:gd name="connsiteY74" fmla="*/ 1580827 h 2262753"/>
+              <a:gd name="connsiteX75" fmla="*/ 2309247 w 4076462"/>
+              <a:gd name="connsiteY75" fmla="*/ 1549831 h 2262753"/>
+              <a:gd name="connsiteX76" fmla="*/ 2200759 w 4076462"/>
+              <a:gd name="connsiteY76" fmla="*/ 1472339 h 2262753"/>
+              <a:gd name="connsiteX77" fmla="*/ 2107769 w 4076462"/>
+              <a:gd name="connsiteY77" fmla="*/ 1441343 h 2262753"/>
+              <a:gd name="connsiteX78" fmla="*/ 2061274 w 4076462"/>
+              <a:gd name="connsiteY78" fmla="*/ 1425844 h 2262753"/>
+              <a:gd name="connsiteX79" fmla="*/ 2014780 w 4076462"/>
+              <a:gd name="connsiteY79" fmla="*/ 1410346 h 2262753"/>
+              <a:gd name="connsiteX80" fmla="*/ 1968285 w 4076462"/>
+              <a:gd name="connsiteY80" fmla="*/ 1394848 h 2262753"/>
+              <a:gd name="connsiteX81" fmla="*/ 1782305 w 4076462"/>
+              <a:gd name="connsiteY81" fmla="*/ 1425844 h 2262753"/>
+              <a:gd name="connsiteX82" fmla="*/ 1704813 w 4076462"/>
+              <a:gd name="connsiteY82" fmla="*/ 1503336 h 2262753"/>
+              <a:gd name="connsiteX83" fmla="*/ 1627322 w 4076462"/>
+              <a:gd name="connsiteY83" fmla="*/ 1596326 h 2262753"/>
+              <a:gd name="connsiteX84" fmla="*/ 1596325 w 4076462"/>
+              <a:gd name="connsiteY84" fmla="*/ 1673817 h 2262753"/>
+            </a:gdLst>
+            <a:ahLst/>
+            <a:cxnLst>
+              <a:cxn ang="0">
+                <a:pos x="connsiteX0" y="connsiteY0"/>
+              </a:cxn>
+              <a:cxn ang="0">
+                <a:pos x="connsiteX1" y="connsiteY1"/>
+              </a:cxn>
+              <a:cxn ang="0">
+                <a:pos x="connsiteX2" y="connsiteY2"/>
+              </a:cxn>
+              <a:cxn ang="0">
+                <a:pos x="connsiteX3" y="connsiteY3"/>
+              </a:cxn>
+              <a:cxn ang="0">
+                <a:pos x="connsiteX4" y="connsiteY4"/>
+              </a:cxn>
+              <a:cxn ang="0">
+                <a:pos x="connsiteX5" y="connsiteY5"/>
+              </a:cxn>
+              <a:cxn ang="0">
+                <a:pos x="connsiteX6" y="connsiteY6"/>
+              </a:cxn>
+              <a:cxn ang="0">
+                <a:pos x="connsiteX7" y="connsiteY7"/>
+              </a:cxn>
+              <a:cxn ang="0">
+                <a:pos x="connsiteX8" y="connsiteY8"/>
+              </a:cxn>
+              <a:cxn ang="0">
+                <a:pos x="connsiteX9" y="connsiteY9"/>
+              </a:cxn>
+              <a:cxn ang="0">
+                <a:pos x="connsiteX10" y="connsiteY10"/>
+              </a:cxn>
+              <a:cxn ang="0">
+                <a:pos x="connsiteX11" y="connsiteY11"/>
+              </a:cxn>
+              <a:cxn ang="0">
+                <a:pos x="connsiteX12" y="connsiteY12"/>
+              </a:cxn>
+              <a:cxn ang="0">
+                <a:pos x="connsiteX13" y="connsiteY13"/>
+              </a:cxn>
+              <a:cxn ang="0">
+                <a:pos x="connsiteX14" y="connsiteY14"/>
+              </a:cxn>
+              <a:cxn ang="0">
+                <a:pos x="connsiteX15" y="connsiteY15"/>
+              </a:cxn>
+              <a:cxn ang="0">
+                <a:pos x="connsiteX16" y="connsiteY16"/>
+              </a:cxn>
+              <a:cxn ang="0">
+                <a:pos x="connsiteX17" y="connsiteY17"/>
+              </a:cxn>
+              <a:cxn ang="0">
+                <a:pos x="connsiteX18" y="connsiteY18"/>
+              </a:cxn>
+              <a:cxn ang="0">
+                <a:pos x="connsiteX19" y="connsiteY19"/>
+              </a:cxn>
+              <a:cxn ang="0">
+                <a:pos x="connsiteX20" y="connsiteY20"/>
+              </a:cxn>
+              <a:cxn ang="0">
+                <a:pos x="connsiteX21" y="connsiteY21"/>
+              </a:cxn>
+              <a:cxn ang="0">
+                <a:pos x="connsiteX22" y="connsiteY22"/>
+              </a:cxn>
+              <a:cxn ang="0">
+                <a:pos x="connsiteX23" y="connsiteY23"/>
+              </a:cxn>
+              <a:cxn ang="0">
+                <a:pos x="connsiteX24" y="connsiteY24"/>
+              </a:cxn>
+              <a:cxn ang="0">
+                <a:pos x="connsiteX25" y="connsiteY25"/>
+              </a:cxn>
+              <a:cxn ang="0">
+                <a:pos x="connsiteX26" y="connsiteY26"/>
+              </a:cxn>
+              <a:cxn ang="0">
+                <a:pos x="connsiteX27" y="connsiteY27"/>
+              </a:cxn>
+              <a:cxn ang="0">
+                <a:pos x="connsiteX28" y="connsiteY28"/>
+              </a:cxn>
+              <a:cxn ang="0">
+                <a:pos x="connsiteX29" y="connsiteY29"/>
+              </a:cxn>
+              <a:cxn ang="0">
+                <a:pos x="connsiteX30" y="connsiteY30"/>
+              </a:cxn>
+              <a:cxn ang="0">
+                <a:pos x="connsiteX31" y="connsiteY31"/>
+              </a:cxn>
+              <a:cxn ang="0">
+                <a:pos x="connsiteX32" y="connsiteY32"/>
+              </a:cxn>
+              <a:cxn ang="0">
+                <a:pos x="connsiteX33" y="connsiteY33"/>
+              </a:cxn>
+              <a:cxn ang="0">
+                <a:pos x="connsiteX34" y="connsiteY34"/>
+              </a:cxn>
+              <a:cxn ang="0">
+                <a:pos x="connsiteX35" y="connsiteY35"/>
+              </a:cxn>
+              <a:cxn ang="0">
+                <a:pos x="connsiteX36" y="connsiteY36"/>
+              </a:cxn>
+              <a:cxn ang="0">
+                <a:pos x="connsiteX37" y="connsiteY37"/>
+              </a:cxn>
+              <a:cxn ang="0">
+                <a:pos x="connsiteX38" y="connsiteY38"/>
+              </a:cxn>
+              <a:cxn ang="0">
+                <a:pos x="connsiteX39" y="connsiteY39"/>
+              </a:cxn>
+              <a:cxn ang="0">
+                <a:pos x="connsiteX40" y="connsiteY40"/>
+              </a:cxn>
+              <a:cxn ang="0">
+                <a:pos x="connsiteX41" y="connsiteY41"/>
+              </a:cxn>
+              <a:cxn ang="0">
+                <a:pos x="connsiteX42" y="connsiteY42"/>
+              </a:cxn>
+              <a:cxn ang="0">
+                <a:pos x="connsiteX43" y="connsiteY43"/>
+              </a:cxn>
+              <a:cxn ang="0">
+                <a:pos x="connsiteX44" y="connsiteY44"/>
+              </a:cxn>
+              <a:cxn ang="0">
+                <a:pos x="connsiteX45" y="connsiteY45"/>
+              </a:cxn>
+              <a:cxn ang="0">
+                <a:pos x="connsiteX46" y="connsiteY46"/>
+              </a:cxn>
+              <a:cxn ang="0">
+                <a:pos x="connsiteX47" y="connsiteY47"/>
+              </a:cxn>
+              <a:cxn ang="0">
+                <a:pos x="connsiteX48" y="connsiteY48"/>
+              </a:cxn>
+              <a:cxn ang="0">
+                <a:pos x="connsiteX49" y="connsiteY49"/>
+              </a:cxn>
+              <a:cxn ang="0">
+                <a:pos x="connsiteX50" y="connsiteY50"/>
+              </a:cxn>
+              <a:cxn ang="0">
+                <a:pos x="connsiteX51" y="connsiteY51"/>
+              </a:cxn>
+              <a:cxn ang="0">
+                <a:pos x="connsiteX52" y="connsiteY52"/>
+              </a:cxn>
+              <a:cxn ang="0">
+                <a:pos x="connsiteX53" y="connsiteY53"/>
+              </a:cxn>
+              <a:cxn ang="0">
+                <a:pos x="connsiteX54" y="connsiteY54"/>
+              </a:cxn>
+              <a:cxn ang="0">
+                <a:pos x="connsiteX55" y="connsiteY55"/>
+              </a:cxn>
+              <a:cxn ang="0">
+                <a:pos x="connsiteX56" y="connsiteY56"/>
+              </a:cxn>
+              <a:cxn ang="0">
+                <a:pos x="connsiteX57" y="connsiteY57"/>
+              </a:cxn>
+              <a:cxn ang="0">
+                <a:pos x="connsiteX58" y="connsiteY58"/>
+              </a:cxn>
+              <a:cxn ang="0">
+                <a:pos x="connsiteX59" y="connsiteY59"/>
+              </a:cxn>
+              <a:cxn ang="0">
+                <a:pos x="connsiteX60" y="connsiteY60"/>
+              </a:cxn>
+              <a:cxn ang="0">
+                <a:pos x="connsiteX61" y="connsiteY61"/>
+              </a:cxn>
+              <a:cxn ang="0">
+                <a:pos x="connsiteX62" y="connsiteY62"/>
+              </a:cxn>
+              <a:cxn ang="0">
+                <a:pos x="connsiteX63" y="connsiteY63"/>
+              </a:cxn>
+              <a:cxn ang="0">
+                <a:pos x="connsiteX64" y="connsiteY64"/>
+              </a:cxn>
+              <a:cxn ang="0">
+                <a:pos x="connsiteX65" y="connsiteY65"/>
+              </a:cxn>
+              <a:cxn ang="0">
+                <a:pos x="connsiteX66" y="connsiteY66"/>
+              </a:cxn>
+              <a:cxn ang="0">
+                <a:pos x="connsiteX67" y="connsiteY67"/>
+              </a:cxn>
+              <a:cxn ang="0">
+                <a:pos x="connsiteX68" y="connsiteY68"/>
+              </a:cxn>
+              <a:cxn ang="0">
+                <a:pos x="connsiteX69" y="connsiteY69"/>
+              </a:cxn>
+              <a:cxn ang="0">
+                <a:pos x="connsiteX70" y="connsiteY70"/>
+              </a:cxn>
+              <a:cxn ang="0">
+                <a:pos x="connsiteX71" y="connsiteY71"/>
+              </a:cxn>
+              <a:cxn ang="0">
+                <a:pos x="connsiteX72" y="connsiteY72"/>
+              </a:cxn>
+              <a:cxn ang="0">
+                <a:pos x="connsiteX73" y="connsiteY73"/>
+              </a:cxn>
+              <a:cxn ang="0">
+                <a:pos x="connsiteX74" y="connsiteY74"/>
+              </a:cxn>
+              <a:cxn ang="0">
+                <a:pos x="connsiteX75" y="connsiteY75"/>
+              </a:cxn>
+              <a:cxn ang="0">
+                <a:pos x="connsiteX76" y="connsiteY76"/>
+              </a:cxn>
+              <a:cxn ang="0">
+                <a:pos x="connsiteX77" y="connsiteY77"/>
+              </a:cxn>
+              <a:cxn ang="0">
+                <a:pos x="connsiteX78" y="connsiteY78"/>
+              </a:cxn>
+              <a:cxn ang="0">
+                <a:pos x="connsiteX79" y="connsiteY79"/>
+              </a:cxn>
+              <a:cxn ang="0">
+                <a:pos x="connsiteX80" y="connsiteY80"/>
+              </a:cxn>
+              <a:cxn ang="0">
+                <a:pos x="connsiteX81" y="connsiteY81"/>
+              </a:cxn>
+              <a:cxn ang="0">
+                <a:pos x="connsiteX82" y="connsiteY82"/>
+              </a:cxn>
+              <a:cxn ang="0">
+                <a:pos x="connsiteX83" y="connsiteY83"/>
+              </a:cxn>
+              <a:cxn ang="0">
+                <a:pos x="connsiteX84" y="connsiteY84"/>
+              </a:cxn>
+            </a:cxnLst>
+            <a:rect l="l" t="t" r="r" b="b"/>
+            <a:pathLst>
+              <a:path w="4076462" h="2262753">
+                <a:moveTo>
+                  <a:pt x="1394847" y="1844299"/>
+                </a:moveTo>
+                <a:cubicBezTo>
+                  <a:pt x="1369017" y="1854631"/>
+                  <a:pt x="1342616" y="1863637"/>
+                  <a:pt x="1317356" y="1875295"/>
+                </a:cubicBezTo>
+                <a:cubicBezTo>
+                  <a:pt x="1275402" y="1894658"/>
+                  <a:pt x="1193369" y="1937288"/>
+                  <a:pt x="1193369" y="1937288"/>
+                </a:cubicBezTo>
+                <a:cubicBezTo>
+                  <a:pt x="1022888" y="1932122"/>
+                  <a:pt x="852222" y="1931251"/>
+                  <a:pt x="681925" y="1921790"/>
+                </a:cubicBezTo>
+                <a:cubicBezTo>
+                  <a:pt x="665614" y="1920884"/>
+                  <a:pt x="651378" y="1909836"/>
+                  <a:pt x="635430" y="1906292"/>
+                </a:cubicBezTo>
+                <a:cubicBezTo>
+                  <a:pt x="293352" y="1830273"/>
+                  <a:pt x="727529" y="1937063"/>
+                  <a:pt x="480447" y="1875295"/>
+                </a:cubicBezTo>
+                <a:cubicBezTo>
+                  <a:pt x="464949" y="1859797"/>
+                  <a:pt x="452538" y="1840416"/>
+                  <a:pt x="433952" y="1828800"/>
+                </a:cubicBezTo>
+                <a:cubicBezTo>
+                  <a:pt x="410361" y="1814055"/>
+                  <a:pt x="377584" y="1815909"/>
+                  <a:pt x="356461" y="1797804"/>
+                </a:cubicBezTo>
+                <a:cubicBezTo>
+                  <a:pt x="338919" y="1782768"/>
+                  <a:pt x="340255" y="1753559"/>
+                  <a:pt x="325464" y="1735810"/>
+                </a:cubicBezTo>
+                <a:cubicBezTo>
+                  <a:pt x="313540" y="1721501"/>
+                  <a:pt x="294467" y="1715146"/>
+                  <a:pt x="278969" y="1704814"/>
+                </a:cubicBezTo>
+                <a:cubicBezTo>
+                  <a:pt x="263471" y="1684150"/>
+                  <a:pt x="249284" y="1662433"/>
+                  <a:pt x="232474" y="1642821"/>
+                </a:cubicBezTo>
+                <a:cubicBezTo>
+                  <a:pt x="218210" y="1626180"/>
+                  <a:pt x="198138" y="1614563"/>
+                  <a:pt x="185980" y="1596326"/>
+                </a:cubicBezTo>
+                <a:cubicBezTo>
+                  <a:pt x="176918" y="1582733"/>
+                  <a:pt x="179139" y="1563685"/>
+                  <a:pt x="170481" y="1549831"/>
+                </a:cubicBezTo>
+                <a:cubicBezTo>
+                  <a:pt x="131324" y="1487179"/>
+                  <a:pt x="74912" y="1450389"/>
+                  <a:pt x="46495" y="1379349"/>
+                </a:cubicBezTo>
+                <a:cubicBezTo>
+                  <a:pt x="7587" y="1282081"/>
+                  <a:pt x="22245" y="1328848"/>
+                  <a:pt x="0" y="1239865"/>
+                </a:cubicBezTo>
+                <a:cubicBezTo>
+                  <a:pt x="5166" y="1090048"/>
+                  <a:pt x="2696" y="939772"/>
+                  <a:pt x="15498" y="790414"/>
+                </a:cubicBezTo>
+                <a:cubicBezTo>
+                  <a:pt x="18288" y="757860"/>
+                  <a:pt x="36163" y="728421"/>
+                  <a:pt x="46495" y="697424"/>
+                </a:cubicBezTo>
+                <a:cubicBezTo>
+                  <a:pt x="74050" y="614758"/>
+                  <a:pt x="88409" y="557063"/>
+                  <a:pt x="139485" y="480448"/>
+                </a:cubicBezTo>
+                <a:cubicBezTo>
+                  <a:pt x="149817" y="464950"/>
+                  <a:pt x="158557" y="448262"/>
+                  <a:pt x="170481" y="433953"/>
+                </a:cubicBezTo>
+                <a:cubicBezTo>
+                  <a:pt x="184512" y="417115"/>
+                  <a:pt x="204236" y="405293"/>
+                  <a:pt x="216976" y="387458"/>
+                </a:cubicBezTo>
+                <a:cubicBezTo>
+                  <a:pt x="230405" y="368658"/>
+                  <a:pt x="233540" y="343506"/>
+                  <a:pt x="247973" y="325465"/>
+                </a:cubicBezTo>
+                <a:cubicBezTo>
+                  <a:pt x="275357" y="291235"/>
+                  <a:pt x="309966" y="263472"/>
+                  <a:pt x="340963" y="232475"/>
+                </a:cubicBezTo>
+                <a:cubicBezTo>
+                  <a:pt x="361627" y="211811"/>
+                  <a:pt x="385422" y="193861"/>
+                  <a:pt x="402956" y="170482"/>
+                </a:cubicBezTo>
+                <a:cubicBezTo>
+                  <a:pt x="492055" y="51683"/>
+                  <a:pt x="405296" y="153033"/>
+                  <a:pt x="495946" y="77492"/>
+                </a:cubicBezTo>
+                <a:cubicBezTo>
+                  <a:pt x="512784" y="63461"/>
+                  <a:pt x="523411" y="41871"/>
+                  <a:pt x="542441" y="30997"/>
+                </a:cubicBezTo>
+                <a:cubicBezTo>
+                  <a:pt x="560935" y="20429"/>
+                  <a:pt x="583953" y="21351"/>
+                  <a:pt x="604434" y="15499"/>
+                </a:cubicBezTo>
+                <a:cubicBezTo>
+                  <a:pt x="620142" y="11011"/>
+                  <a:pt x="635431" y="5166"/>
+                  <a:pt x="650929" y="0"/>
+                </a:cubicBezTo>
+                <a:lnTo>
+                  <a:pt x="1456841" y="15499"/>
+                </a:lnTo>
+                <a:cubicBezTo>
+                  <a:pt x="1473167" y="16093"/>
+                  <a:pt x="1489553" y="22226"/>
+                  <a:pt x="1503336" y="30997"/>
+                </a:cubicBezTo>
+                <a:cubicBezTo>
+                  <a:pt x="1546920" y="58733"/>
+                  <a:pt x="1590792" y="87457"/>
+                  <a:pt x="1627322" y="123987"/>
+                </a:cubicBezTo>
+                <a:lnTo>
+                  <a:pt x="1673817" y="170482"/>
+                </a:lnTo>
+                <a:cubicBezTo>
+                  <a:pt x="1698277" y="219403"/>
+                  <a:pt x="1729400" y="288059"/>
+                  <a:pt x="1766807" y="325465"/>
+                </a:cubicBezTo>
+                <a:cubicBezTo>
+                  <a:pt x="1797804" y="356461"/>
+                  <a:pt x="1830674" y="385691"/>
+                  <a:pt x="1859797" y="418454"/>
+                </a:cubicBezTo>
+                <a:cubicBezTo>
+                  <a:pt x="1872172" y="432376"/>
+                  <a:pt x="1878527" y="450931"/>
+                  <a:pt x="1890793" y="464949"/>
+                </a:cubicBezTo>
+                <a:cubicBezTo>
+                  <a:pt x="1914848" y="492441"/>
+                  <a:pt x="1945153" y="514168"/>
+                  <a:pt x="1968285" y="542441"/>
+                </a:cubicBezTo>
+                <a:cubicBezTo>
+                  <a:pt x="1991875" y="571273"/>
+                  <a:pt x="2003936" y="609089"/>
+                  <a:pt x="2030278" y="635431"/>
+                </a:cubicBezTo>
+                <a:cubicBezTo>
+                  <a:pt x="2056108" y="661261"/>
+                  <a:pt x="2079244" y="690102"/>
+                  <a:pt x="2107769" y="712922"/>
+                </a:cubicBezTo>
+                <a:cubicBezTo>
+                  <a:pt x="2305784" y="871334"/>
+                  <a:pt x="2076808" y="656771"/>
+                  <a:pt x="2247254" y="805912"/>
+                </a:cubicBezTo>
+                <a:cubicBezTo>
+                  <a:pt x="2269247" y="825156"/>
+                  <a:pt x="2284931" y="851695"/>
+                  <a:pt x="2309247" y="867905"/>
+                </a:cubicBezTo>
+                <a:cubicBezTo>
+                  <a:pt x="2332395" y="883337"/>
+                  <a:pt x="2360594" y="889394"/>
+                  <a:pt x="2386739" y="898902"/>
+                </a:cubicBezTo>
+                <a:cubicBezTo>
+                  <a:pt x="2417445" y="910068"/>
+                  <a:pt x="2452543" y="911775"/>
+                  <a:pt x="2479729" y="929899"/>
+                </a:cubicBezTo>
+                <a:cubicBezTo>
+                  <a:pt x="2495227" y="940231"/>
+                  <a:pt x="2508254" y="955994"/>
+                  <a:pt x="2526224" y="960895"/>
+                </a:cubicBezTo>
+                <a:cubicBezTo>
+                  <a:pt x="2566407" y="971854"/>
+                  <a:pt x="2608881" y="971227"/>
+                  <a:pt x="2650210" y="976393"/>
+                </a:cubicBezTo>
+                <a:cubicBezTo>
+                  <a:pt x="2670874" y="981559"/>
+                  <a:pt x="2690903" y="991892"/>
+                  <a:pt x="2712203" y="991892"/>
+                </a:cubicBezTo>
+                <a:cubicBezTo>
+                  <a:pt x="2792892" y="991892"/>
+                  <a:pt x="2894768" y="995569"/>
+                  <a:pt x="2975674" y="960895"/>
+                </a:cubicBezTo>
+                <a:cubicBezTo>
+                  <a:pt x="2996910" y="951794"/>
+                  <a:pt x="3017003" y="940231"/>
+                  <a:pt x="3037668" y="929899"/>
+                </a:cubicBezTo>
+                <a:lnTo>
+                  <a:pt x="3425125" y="945397"/>
+                </a:lnTo>
+                <a:cubicBezTo>
+                  <a:pt x="3588108" y="954451"/>
+                  <a:pt x="3548278" y="945119"/>
+                  <a:pt x="3642102" y="976393"/>
+                </a:cubicBezTo>
+                <a:lnTo>
+                  <a:pt x="3735091" y="1038387"/>
+                </a:lnTo>
+                <a:cubicBezTo>
+                  <a:pt x="3750589" y="1048719"/>
+                  <a:pt x="3768415" y="1056212"/>
+                  <a:pt x="3781586" y="1069383"/>
+                </a:cubicBezTo>
+                <a:lnTo>
+                  <a:pt x="3828081" y="1115878"/>
+                </a:lnTo>
+                <a:cubicBezTo>
+                  <a:pt x="3833247" y="1131376"/>
+                  <a:pt x="3833550" y="1149478"/>
+                  <a:pt x="3843580" y="1162373"/>
+                </a:cubicBezTo>
+                <a:cubicBezTo>
+                  <a:pt x="3870492" y="1196975"/>
+                  <a:pt x="3905573" y="1224366"/>
+                  <a:pt x="3936569" y="1255363"/>
+                </a:cubicBezTo>
+                <a:cubicBezTo>
+                  <a:pt x="3952067" y="1270861"/>
+                  <a:pt x="3970906" y="1283621"/>
+                  <a:pt x="3983064" y="1301858"/>
+                </a:cubicBezTo>
+                <a:lnTo>
+                  <a:pt x="4014061" y="1348353"/>
+                </a:lnTo>
+                <a:cubicBezTo>
+                  <a:pt x="4049020" y="1488188"/>
+                  <a:pt x="4031587" y="1431924"/>
+                  <a:pt x="4060556" y="1518834"/>
+                </a:cubicBezTo>
+                <a:cubicBezTo>
+                  <a:pt x="4077572" y="1757067"/>
+                  <a:pt x="4085582" y="1733516"/>
+                  <a:pt x="4060556" y="1983783"/>
+                </a:cubicBezTo>
+                <a:cubicBezTo>
+                  <a:pt x="4058437" y="2004978"/>
+                  <a:pt x="4054584" y="2026725"/>
+                  <a:pt x="4045058" y="2045777"/>
+                </a:cubicBezTo>
+                <a:cubicBezTo>
+                  <a:pt x="4033506" y="2068881"/>
+                  <a:pt x="4013577" y="2086751"/>
+                  <a:pt x="3998563" y="2107770"/>
+                </a:cubicBezTo>
+                <a:cubicBezTo>
+                  <a:pt x="3987736" y="2122927"/>
+                  <a:pt x="3980737" y="2141094"/>
+                  <a:pt x="3967566" y="2154265"/>
+                </a:cubicBezTo>
+                <a:cubicBezTo>
+                  <a:pt x="3954395" y="2167436"/>
+                  <a:pt x="3937731" y="2176931"/>
+                  <a:pt x="3921071" y="2185261"/>
+                </a:cubicBezTo>
+                <a:cubicBezTo>
+                  <a:pt x="3877001" y="2207296"/>
+                  <a:pt x="3807835" y="2209667"/>
+                  <a:pt x="3766088" y="2216258"/>
+                </a:cubicBezTo>
+                <a:lnTo>
+                  <a:pt x="3580108" y="2247254"/>
+                </a:lnTo>
+                <a:lnTo>
+                  <a:pt x="3487119" y="2262753"/>
+                </a:lnTo>
+                <a:cubicBezTo>
+                  <a:pt x="3352800" y="2257587"/>
+                  <a:pt x="3218061" y="2259069"/>
+                  <a:pt x="3084163" y="2247254"/>
+                </a:cubicBezTo>
+                <a:cubicBezTo>
+                  <a:pt x="3004231" y="2240201"/>
+                  <a:pt x="2977619" y="2219028"/>
+                  <a:pt x="2913681" y="2200760"/>
+                </a:cubicBezTo>
+                <a:cubicBezTo>
+                  <a:pt x="2893200" y="2194908"/>
+                  <a:pt x="2872352" y="2190427"/>
+                  <a:pt x="2851688" y="2185261"/>
+                </a:cubicBezTo>
+                <a:cubicBezTo>
+                  <a:pt x="2772645" y="2066698"/>
+                  <a:pt x="2881048" y="2212641"/>
+                  <a:pt x="2758698" y="2107770"/>
+                </a:cubicBezTo>
+                <a:cubicBezTo>
+                  <a:pt x="2739086" y="2090960"/>
+                  <a:pt x="2729013" y="2065389"/>
+                  <a:pt x="2712203" y="2045777"/>
+                </a:cubicBezTo>
+                <a:cubicBezTo>
+                  <a:pt x="2697939" y="2029136"/>
+                  <a:pt x="2679587" y="2016246"/>
+                  <a:pt x="2665708" y="1999282"/>
+                </a:cubicBezTo>
+                <a:cubicBezTo>
+                  <a:pt x="2632994" y="1959298"/>
+                  <a:pt x="2601376" y="1918279"/>
+                  <a:pt x="2572719" y="1875295"/>
+                </a:cubicBezTo>
+                <a:lnTo>
+                  <a:pt x="2510725" y="1782305"/>
+                </a:lnTo>
+                <a:cubicBezTo>
+                  <a:pt x="2480553" y="1691788"/>
+                  <a:pt x="2518835" y="1774917"/>
+                  <a:pt x="2448732" y="1704814"/>
+                </a:cubicBezTo>
+                <a:cubicBezTo>
+                  <a:pt x="2425341" y="1681423"/>
+                  <a:pt x="2406587" y="1653785"/>
+                  <a:pt x="2386739" y="1627322"/>
+                </a:cubicBezTo>
+                <a:cubicBezTo>
+                  <a:pt x="2375563" y="1612421"/>
+                  <a:pt x="2368913" y="1593998"/>
+                  <a:pt x="2355742" y="1580827"/>
+                </a:cubicBezTo>
+                <a:cubicBezTo>
+                  <a:pt x="2342571" y="1567656"/>
+                  <a:pt x="2323556" y="1561755"/>
+                  <a:pt x="2309247" y="1549831"/>
+                </a:cubicBezTo>
+                <a:cubicBezTo>
+                  <a:pt x="2240114" y="1492220"/>
+                  <a:pt x="2288998" y="1507635"/>
+                  <a:pt x="2200759" y="1472339"/>
+                </a:cubicBezTo>
+                <a:cubicBezTo>
+                  <a:pt x="2170423" y="1460204"/>
+                  <a:pt x="2138766" y="1451675"/>
+                  <a:pt x="2107769" y="1441343"/>
+                </a:cubicBezTo>
+                <a:lnTo>
+                  <a:pt x="2061274" y="1425844"/>
+                </a:lnTo>
+                <a:lnTo>
+                  <a:pt x="2014780" y="1410346"/>
+                </a:lnTo>
+                <a:lnTo>
+                  <a:pt x="1968285" y="1394848"/>
+                </a:lnTo>
+                <a:cubicBezTo>
+                  <a:pt x="1906292" y="1405180"/>
+                  <a:pt x="1843031" y="1409650"/>
+                  <a:pt x="1782305" y="1425844"/>
+                </a:cubicBezTo>
+                <a:cubicBezTo>
+                  <a:pt x="1733597" y="1438833"/>
+                  <a:pt x="1732857" y="1469683"/>
+                  <a:pt x="1704813" y="1503336"/>
+                </a:cubicBezTo>
+                <a:cubicBezTo>
+                  <a:pt x="1605370" y="1622668"/>
+                  <a:pt x="1704282" y="1480887"/>
+                  <a:pt x="1627322" y="1596326"/>
+                </a:cubicBezTo>
+                <a:cubicBezTo>
+                  <a:pt x="1610052" y="1665407"/>
+                  <a:pt x="1626886" y="1643258"/>
+                  <a:pt x="1596325" y="1673817"/>
+                </a:cubicBezTo>
+              </a:path>
+            </a:pathLst>
+          </a:custGeom>
+          <a:noFill/>
+          <a:ln w="76200">
+            <a:solidFill>
+              <a:schemeClr val="tx1"/>
+            </a:solidFill>
+            <a:prstDash val="dash"/>
+          </a:ln>
+        </p:spPr>
+        <p:style>
+          <a:lnRef idx="2">
+            <a:schemeClr val="accent1">
+              <a:shade val="50000"/>
+            </a:schemeClr>
+          </a:lnRef>
+          <a:fillRef idx="1">
+            <a:schemeClr val="accent1"/>
+          </a:fillRef>
+          <a:effectRef idx="0">
+            <a:schemeClr val="accent1"/>
+          </a:effectRef>
+          <a:fontRef idx="minor">
+            <a:schemeClr val="lt1"/>
+          </a:fontRef>
+        </p:style>
+        <p:txBody>
+          <a:bodyPr rtlCol="0" anchor="ctr"/>
+          <a:lstStyle/>
+          <a:p>
+            <a:pPr algn="ctr"/>
+            <a:endParaRPr lang="en-GB"/>
+          </a:p>
+        </p:txBody>
+      </p:sp>
+      <p:cxnSp>
+        <p:nvCxnSpPr>
+          <p:cNvPr id="10" name="Straight Connector 9"/>
+          <p:cNvCxnSpPr/>
+          <p:nvPr/>
+        </p:nvCxnSpPr>
+        <p:spPr>
+          <a:xfrm>
+            <a:off x="5486400" y="3733800"/>
+            <a:ext cx="2286000" cy="1653153"/>
+          </a:xfrm>
+          <a:prstGeom prst="line">
+            <a:avLst/>
+          </a:prstGeom>
+          <a:ln w="76200">
+            <a:solidFill>
+              <a:schemeClr val="tx1"/>
+            </a:solidFill>
+          </a:ln>
+        </p:spPr>
+        <p:style>
+          <a:lnRef idx="1">
+            <a:schemeClr val="accent1"/>
+          </a:lnRef>
+          <a:fillRef idx="0">
+            <a:schemeClr val="accent1"/>
+          </a:fillRef>
+          <a:effectRef idx="0">
+            <a:schemeClr val="accent1"/>
+          </a:effectRef>
+          <a:fontRef idx="minor">
+            <a:schemeClr val="tx1"/>
+          </a:fontRef>
+        </p:style>
+      </p:cxnSp>
+    </p:spTree>
+    <p:extLst>
+      <p:ext uri="{BB962C8B-B14F-4D97-AF65-F5344CB8AC3E}">
+        <p14:creationId xmlns:p14="http://schemas.microsoft.com/office/powerpoint/2010/main" val="2364304051"/>
+      </p:ext>
+    </p:extLst>
+  </p:cSld>
+  <p:clrMapOvr>
+    <a:masterClrMapping/>
+  </p:clrMapOvr>
+</p:sld>
 </file>
 
 <file path=ppt/theme/theme1.xml><?xml version="1.0" encoding="utf-8"?>
@@ -3317,7 +4365,41 @@
       </a:bgFillStyleLst>
     </a:fmtScheme>
   </a:themeElements>
-  <a:objectDefaults/>
+  <a:objectDefaults>
+    <a:spDef>
+      <a:spPr>
+        <a:noFill/>
+        <a:ln w="76200">
+          <a:solidFill>
+            <a:schemeClr val="tx1"/>
+          </a:solidFill>
+          <a:prstDash val="dash"/>
+        </a:ln>
+      </a:spPr>
+      <a:bodyPr rtlCol="0" anchor="ctr"/>
+      <a:lstStyle>
+        <a:defPPr algn="ctr">
+          <a:defRPr/>
+        </a:defPPr>
+      </a:lstStyle>
+      <a:style>
+        <a:lnRef idx="2">
+          <a:schemeClr val="accent1">
+            <a:shade val="50000"/>
+          </a:schemeClr>
+        </a:lnRef>
+        <a:fillRef idx="1">
+          <a:schemeClr val="accent1"/>
+        </a:fillRef>
+        <a:effectRef idx="0">
+          <a:schemeClr val="accent1"/>
+        </a:effectRef>
+        <a:fontRef idx="minor">
+          <a:schemeClr val="lt1"/>
+        </a:fontRef>
+      </a:style>
+    </a:spDef>
+  </a:objectDefaults>
   <a:extraClrSchemeLst/>
 </a:theme>
 </file>
</xml_diff>